<commit_message>
some more small polish things
</commit_message>
<xml_diff>
--- a/slides/04-TuringMachines.pptx
+++ b/slides/04-TuringMachines.pptx
@@ -5,7 +5,7 @@
     <p:sldMasterId id="2147484006" r:id="rId1"/>
   </p:sldMasterIdLst>
   <p:notesMasterIdLst>
-    <p:notesMasterId r:id="rId28"/>
+    <p:notesMasterId r:id="rId33"/>
   </p:notesMasterIdLst>
   <p:sldIdLst>
     <p:sldId id="256" r:id="rId2"/>
@@ -34,6 +34,11 @@
     <p:sldId id="478" r:id="rId25"/>
     <p:sldId id="363" r:id="rId26"/>
     <p:sldId id="479" r:id="rId27"/>
+    <p:sldId id="480" r:id="rId28"/>
+    <p:sldId id="481" r:id="rId29"/>
+    <p:sldId id="482" r:id="rId30"/>
+    <p:sldId id="483" r:id="rId31"/>
+    <p:sldId id="484" r:id="rId32"/>
   </p:sldIdLst>
   <p:sldSz cx="12192000" cy="6858000"/>
   <p:notesSz cx="6858000" cy="9144000"/>
@@ -18684,6 +18689,1037 @@
 </p:sld>
 </file>
 
+<file path=ppt/slides/slide27.xml><?xml version="1.0" encoding="utf-8"?>
+<p:sld xmlns:a="http://schemas.openxmlformats.org/drawingml/2006/main" xmlns:r="http://schemas.openxmlformats.org/officeDocument/2006/relationships" xmlns:p="http://schemas.openxmlformats.org/presentationml/2006/main">
+  <p:cSld>
+    <p:spTree>
+      <p:nvGrpSpPr>
+        <p:cNvPr id="1" name=""/>
+        <p:cNvGrpSpPr/>
+        <p:nvPr/>
+      </p:nvGrpSpPr>
+      <p:grpSpPr>
+        <a:xfrm>
+          <a:off x="0" y="0"/>
+          <a:ext cx="0" cy="0"/>
+          <a:chOff x="0" y="0"/>
+          <a:chExt cx="0" cy="0"/>
+        </a:xfrm>
+      </p:grpSpPr>
+      <p:sp>
+        <p:nvSpPr>
+          <p:cNvPr id="2" name="Title 1">
+            <a:extLst>
+              <a:ext uri="{FF2B5EF4-FFF2-40B4-BE49-F238E27FC236}">
+                <a16:creationId xmlns:a16="http://schemas.microsoft.com/office/drawing/2014/main" id="{D63C04CD-2329-4D47-84D9-12CB3EDD9F46}"/>
+              </a:ext>
+            </a:extLst>
+          </p:cNvPr>
+          <p:cNvSpPr>
+            <a:spLocks noGrp="1"/>
+          </p:cNvSpPr>
+          <p:nvPr>
+            <p:ph type="title"/>
+          </p:nvPr>
+        </p:nvSpPr>
+        <p:spPr>
+          <a:xfrm>
+            <a:off x="1141413" y="125537"/>
+            <a:ext cx="9905998" cy="860425"/>
+          </a:xfrm>
+        </p:spPr>
+        <p:txBody>
+          <a:bodyPr/>
+          <a:lstStyle/>
+          <a:p>
+            <a:pPr algn="ctr"/>
+            <a:r>
+              <a:rPr lang="en-US" dirty="0"/>
+              <a:t>Hilbert’s Problems</a:t>
+            </a:r>
+          </a:p>
+        </p:txBody>
+      </p:sp>
+      <p:sp>
+        <p:nvSpPr>
+          <p:cNvPr id="3" name="Content Placeholder 2">
+            <a:extLst>
+              <a:ext uri="{FF2B5EF4-FFF2-40B4-BE49-F238E27FC236}">
+                <a16:creationId xmlns:a16="http://schemas.microsoft.com/office/drawing/2014/main" id="{14278F5F-F936-6145-9FF8-704886F1A386}"/>
+              </a:ext>
+            </a:extLst>
+          </p:cNvPr>
+          <p:cNvSpPr>
+            <a:spLocks noGrp="1"/>
+          </p:cNvSpPr>
+          <p:nvPr>
+            <p:ph idx="1"/>
+          </p:nvPr>
+        </p:nvSpPr>
+        <p:spPr>
+          <a:xfrm>
+            <a:off x="1141412" y="1559371"/>
+            <a:ext cx="9905999" cy="1089328"/>
+          </a:xfrm>
+          <a:solidFill>
+            <a:schemeClr val="tx1">
+              <a:lumMod val="95000"/>
+            </a:schemeClr>
+          </a:solidFill>
+        </p:spPr>
+        <p:txBody>
+          <a:bodyPr/>
+          <a:lstStyle/>
+          <a:p>
+            <a:pPr marL="0" indent="0">
+              <a:buNone/>
+            </a:pPr>
+            <a:r>
+              <a:rPr lang="en-US" dirty="0">
+                <a:solidFill>
+                  <a:schemeClr val="bg1"/>
+                </a:solidFill>
+              </a:rPr>
+              <a:t>See page 183 of book</a:t>
+            </a:r>
+          </a:p>
+        </p:txBody>
+      </p:sp>
+      <p:sp>
+        <p:nvSpPr>
+          <p:cNvPr id="6" name="Content Placeholder 2">
+            <a:extLst>
+              <a:ext uri="{FF2B5EF4-FFF2-40B4-BE49-F238E27FC236}">
+                <a16:creationId xmlns:a16="http://schemas.microsoft.com/office/drawing/2014/main" id="{D1AB4AE0-9143-C34D-B965-4033C921D6B5}"/>
+              </a:ext>
+            </a:extLst>
+          </p:cNvPr>
+          <p:cNvSpPr txBox="1">
+            <a:spLocks/>
+          </p:cNvSpPr>
+          <p:nvPr/>
+        </p:nvSpPr>
+        <p:spPr>
+          <a:xfrm>
+            <a:off x="1141412" y="2888722"/>
+            <a:ext cx="9905999" cy="1089328"/>
+          </a:xfrm>
+          <a:prstGeom prst="rect">
+            <a:avLst/>
+          </a:prstGeom>
+          <a:noFill/>
+        </p:spPr>
+        <p:txBody>
+          <a:bodyPr vert="horz" lIns="91440" tIns="45720" rIns="91440" bIns="45720" rtlCol="0">
+            <a:normAutofit/>
+          </a:bodyPr>
+          <a:lstStyle>
+            <a:lvl1pPr marL="228600" indent="-228600" algn="l" defTabSz="914400" rtl="0" eaLnBrk="1" latinLnBrk="0" hangingPunct="1">
+              <a:lnSpc>
+                <a:spcPct val="120000"/>
+              </a:lnSpc>
+              <a:spcBef>
+                <a:spcPts val="1000"/>
+              </a:spcBef>
+              <a:buSzPct val="125000"/>
+              <a:buFont typeface="Arial" panose="020B0604020202020204" pitchFamily="34" charset="0"/>
+              <a:buChar char="•"/>
+              <a:defRPr sz="2400" kern="1200">
+                <a:solidFill>
+                  <a:schemeClr val="tx1"/>
+                </a:solidFill>
+                <a:latin typeface="+mn-lt"/>
+                <a:ea typeface="+mn-ea"/>
+                <a:cs typeface="+mn-cs"/>
+              </a:defRPr>
+            </a:lvl1pPr>
+            <a:lvl2pPr marL="685800" indent="-228600" algn="l" defTabSz="914400" rtl="0" eaLnBrk="1" latinLnBrk="0" hangingPunct="1">
+              <a:lnSpc>
+                <a:spcPct val="120000"/>
+              </a:lnSpc>
+              <a:spcBef>
+                <a:spcPts val="500"/>
+              </a:spcBef>
+              <a:buSzPct val="125000"/>
+              <a:buFont typeface="Arial" panose="020B0604020202020204" pitchFamily="34" charset="0"/>
+              <a:buChar char="•"/>
+              <a:defRPr sz="2000" kern="1200">
+                <a:solidFill>
+                  <a:schemeClr val="tx1"/>
+                </a:solidFill>
+                <a:latin typeface="+mn-lt"/>
+                <a:ea typeface="+mn-ea"/>
+                <a:cs typeface="+mn-cs"/>
+              </a:defRPr>
+            </a:lvl2pPr>
+            <a:lvl3pPr marL="1143000" indent="-228600" algn="l" defTabSz="914400" rtl="0" eaLnBrk="1" latinLnBrk="0" hangingPunct="1">
+              <a:lnSpc>
+                <a:spcPct val="120000"/>
+              </a:lnSpc>
+              <a:spcBef>
+                <a:spcPts val="500"/>
+              </a:spcBef>
+              <a:buSzPct val="125000"/>
+              <a:buFont typeface="Arial" panose="020B0604020202020204" pitchFamily="34" charset="0"/>
+              <a:buChar char="•"/>
+              <a:defRPr sz="1800" kern="1200">
+                <a:solidFill>
+                  <a:schemeClr val="tx1"/>
+                </a:solidFill>
+                <a:latin typeface="+mn-lt"/>
+                <a:ea typeface="+mn-ea"/>
+                <a:cs typeface="+mn-cs"/>
+              </a:defRPr>
+            </a:lvl3pPr>
+            <a:lvl4pPr marL="1600200" indent="-228600" algn="l" defTabSz="914400" rtl="0" eaLnBrk="1" latinLnBrk="0" hangingPunct="1">
+              <a:lnSpc>
+                <a:spcPct val="120000"/>
+              </a:lnSpc>
+              <a:spcBef>
+                <a:spcPts val="500"/>
+              </a:spcBef>
+              <a:buSzPct val="125000"/>
+              <a:buFont typeface="Arial" panose="020B0604020202020204" pitchFamily="34" charset="0"/>
+              <a:buChar char="•"/>
+              <a:defRPr sz="1600" kern="1200">
+                <a:solidFill>
+                  <a:schemeClr val="tx1"/>
+                </a:solidFill>
+                <a:latin typeface="+mn-lt"/>
+                <a:ea typeface="+mn-ea"/>
+                <a:cs typeface="+mn-cs"/>
+              </a:defRPr>
+            </a:lvl4pPr>
+            <a:lvl5pPr marL="2057400" indent="-228600" algn="l" defTabSz="914400" rtl="0" eaLnBrk="1" latinLnBrk="0" hangingPunct="1">
+              <a:lnSpc>
+                <a:spcPct val="120000"/>
+              </a:lnSpc>
+              <a:spcBef>
+                <a:spcPts val="500"/>
+              </a:spcBef>
+              <a:buSzPct val="125000"/>
+              <a:buFont typeface="Arial" panose="020B0604020202020204" pitchFamily="34" charset="0"/>
+              <a:buChar char="•"/>
+              <a:defRPr sz="1600" kern="1200">
+                <a:solidFill>
+                  <a:schemeClr val="tx1"/>
+                </a:solidFill>
+                <a:latin typeface="+mn-lt"/>
+                <a:ea typeface="+mn-ea"/>
+                <a:cs typeface="+mn-cs"/>
+              </a:defRPr>
+            </a:lvl5pPr>
+            <a:lvl6pPr marL="2514600" indent="-228600" algn="l" defTabSz="914400" rtl="0" eaLnBrk="1" latinLnBrk="0" hangingPunct="1">
+              <a:lnSpc>
+                <a:spcPct val="120000"/>
+              </a:lnSpc>
+              <a:spcBef>
+                <a:spcPts val="500"/>
+              </a:spcBef>
+              <a:buSzPct val="125000"/>
+              <a:buFont typeface="Arial" panose="020B0604020202020204" pitchFamily="34" charset="0"/>
+              <a:buChar char="•"/>
+              <a:defRPr sz="1400" kern="1200">
+                <a:solidFill>
+                  <a:schemeClr val="tx1"/>
+                </a:solidFill>
+                <a:latin typeface="+mn-lt"/>
+                <a:ea typeface="+mn-ea"/>
+                <a:cs typeface="+mn-cs"/>
+              </a:defRPr>
+            </a:lvl6pPr>
+            <a:lvl7pPr marL="2971800" indent="-228600" algn="l" defTabSz="914400" rtl="0" eaLnBrk="1" latinLnBrk="0" hangingPunct="1">
+              <a:lnSpc>
+                <a:spcPct val="120000"/>
+              </a:lnSpc>
+              <a:spcBef>
+                <a:spcPts val="500"/>
+              </a:spcBef>
+              <a:buSzPct val="125000"/>
+              <a:buFont typeface="Arial" panose="020B0604020202020204" pitchFamily="34" charset="0"/>
+              <a:buChar char="•"/>
+              <a:defRPr sz="1400" kern="1200">
+                <a:solidFill>
+                  <a:schemeClr val="tx1"/>
+                </a:solidFill>
+                <a:latin typeface="+mn-lt"/>
+                <a:ea typeface="+mn-ea"/>
+                <a:cs typeface="+mn-cs"/>
+              </a:defRPr>
+            </a:lvl7pPr>
+            <a:lvl8pPr marL="3429000" indent="-228600" algn="l" defTabSz="914400" rtl="0" eaLnBrk="1" latinLnBrk="0" hangingPunct="1">
+              <a:lnSpc>
+                <a:spcPct val="120000"/>
+              </a:lnSpc>
+              <a:spcBef>
+                <a:spcPts val="500"/>
+              </a:spcBef>
+              <a:buSzPct val="125000"/>
+              <a:buFont typeface="Arial" panose="020B0604020202020204" pitchFamily="34" charset="0"/>
+              <a:buChar char="•"/>
+              <a:defRPr sz="1400" kern="1200">
+                <a:solidFill>
+                  <a:schemeClr val="tx1"/>
+                </a:solidFill>
+                <a:latin typeface="+mn-lt"/>
+                <a:ea typeface="+mn-ea"/>
+                <a:cs typeface="+mn-cs"/>
+              </a:defRPr>
+            </a:lvl8pPr>
+            <a:lvl9pPr marL="3886200" indent="-228600" algn="l" defTabSz="914400" rtl="0" eaLnBrk="1" latinLnBrk="0" hangingPunct="1">
+              <a:lnSpc>
+                <a:spcPct val="120000"/>
+              </a:lnSpc>
+              <a:spcBef>
+                <a:spcPts val="500"/>
+              </a:spcBef>
+              <a:buSzPct val="125000"/>
+              <a:buFont typeface="Arial" panose="020B0604020202020204" pitchFamily="34" charset="0"/>
+              <a:buChar char="•"/>
+              <a:defRPr sz="1400" kern="1200">
+                <a:solidFill>
+                  <a:schemeClr val="tx1"/>
+                </a:solidFill>
+                <a:latin typeface="+mn-lt"/>
+                <a:ea typeface="+mn-ea"/>
+                <a:cs typeface="+mn-cs"/>
+              </a:defRPr>
+            </a:lvl9pPr>
+          </a:lstStyle>
+          <a:p>
+            <a:pPr marL="0" indent="0">
+              <a:buFont typeface="Arial" panose="020B0604020202020204" pitchFamily="34" charset="0"/>
+              <a:buNone/>
+            </a:pPr>
+            <a:r>
+              <a:rPr lang="en-US" dirty="0">
+                <a:solidFill>
+                  <a:schemeClr val="tx1">
+                    <a:lumMod val="95000"/>
+                  </a:schemeClr>
+                </a:solidFill>
+              </a:rPr>
+              <a:t>Story of finding polynomial roots. Not possible to prove because no formal definition of algorithm</a:t>
+            </a:r>
+          </a:p>
+        </p:txBody>
+      </p:sp>
+    </p:spTree>
+    <p:extLst>
+      <p:ext uri="{BB962C8B-B14F-4D97-AF65-F5344CB8AC3E}">
+        <p14:creationId xmlns:p14="http://schemas.microsoft.com/office/powerpoint/2010/main" val="3588481984"/>
+      </p:ext>
+    </p:extLst>
+  </p:cSld>
+  <p:clrMapOvr>
+    <a:masterClrMapping/>
+  </p:clrMapOvr>
+</p:sld>
+</file>
+
+<file path=ppt/slides/slide28.xml><?xml version="1.0" encoding="utf-8"?>
+<p:sld xmlns:a="http://schemas.openxmlformats.org/drawingml/2006/main" xmlns:r="http://schemas.openxmlformats.org/officeDocument/2006/relationships" xmlns:p="http://schemas.openxmlformats.org/presentationml/2006/main">
+  <p:cSld>
+    <p:spTree>
+      <p:nvGrpSpPr>
+        <p:cNvPr id="1" name=""/>
+        <p:cNvGrpSpPr/>
+        <p:nvPr/>
+      </p:nvGrpSpPr>
+      <p:grpSpPr>
+        <a:xfrm>
+          <a:off x="0" y="0"/>
+          <a:ext cx="0" cy="0"/>
+          <a:chOff x="0" y="0"/>
+          <a:chExt cx="0" cy="0"/>
+        </a:xfrm>
+      </p:grpSpPr>
+      <p:sp>
+        <p:nvSpPr>
+          <p:cNvPr id="2" name="Title 1">
+            <a:extLst>
+              <a:ext uri="{FF2B5EF4-FFF2-40B4-BE49-F238E27FC236}">
+                <a16:creationId xmlns:a16="http://schemas.microsoft.com/office/drawing/2014/main" id="{D63C04CD-2329-4D47-84D9-12CB3EDD9F46}"/>
+              </a:ext>
+            </a:extLst>
+          </p:cNvPr>
+          <p:cNvSpPr>
+            <a:spLocks noGrp="1"/>
+          </p:cNvSpPr>
+          <p:nvPr>
+            <p:ph type="title"/>
+          </p:nvPr>
+        </p:nvSpPr>
+        <p:spPr>
+          <a:xfrm>
+            <a:off x="1141413" y="125537"/>
+            <a:ext cx="9905998" cy="860425"/>
+          </a:xfrm>
+        </p:spPr>
+        <p:txBody>
+          <a:bodyPr/>
+          <a:lstStyle/>
+          <a:p>
+            <a:pPr algn="ctr"/>
+            <a:r>
+              <a:rPr lang="en-US" dirty="0"/>
+              <a:t>The Church-Turing Thesis</a:t>
+            </a:r>
+          </a:p>
+        </p:txBody>
+      </p:sp>
+      <p:sp>
+        <p:nvSpPr>
+          <p:cNvPr id="3" name="Content Placeholder 2">
+            <a:extLst>
+              <a:ext uri="{FF2B5EF4-FFF2-40B4-BE49-F238E27FC236}">
+                <a16:creationId xmlns:a16="http://schemas.microsoft.com/office/drawing/2014/main" id="{14278F5F-F936-6145-9FF8-704886F1A386}"/>
+              </a:ext>
+            </a:extLst>
+          </p:cNvPr>
+          <p:cNvSpPr>
+            <a:spLocks noGrp="1"/>
+          </p:cNvSpPr>
+          <p:nvPr>
+            <p:ph idx="1"/>
+          </p:nvPr>
+        </p:nvSpPr>
+        <p:spPr>
+          <a:xfrm>
+            <a:off x="1141412" y="1559371"/>
+            <a:ext cx="9905999" cy="1089328"/>
+          </a:xfrm>
+          <a:solidFill>
+            <a:schemeClr val="tx1">
+              <a:lumMod val="95000"/>
+            </a:schemeClr>
+          </a:solidFill>
+        </p:spPr>
+        <p:txBody>
+          <a:bodyPr>
+            <a:normAutofit fontScale="92500"/>
+          </a:bodyPr>
+          <a:lstStyle/>
+          <a:p>
+            <a:pPr marL="0" indent="0">
+              <a:buNone/>
+            </a:pPr>
+            <a:r>
+              <a:rPr lang="en-US" b="1" i="1" u="sng" dirty="0">
+                <a:solidFill>
+                  <a:schemeClr val="bg1"/>
+                </a:solidFill>
+              </a:rPr>
+              <a:t>The Church-Turing Thesis (1936)</a:t>
+            </a:r>
+            <a:r>
+              <a:rPr lang="en-US" dirty="0">
+                <a:solidFill>
+                  <a:schemeClr val="bg1"/>
+                </a:solidFill>
+              </a:rPr>
+              <a:t>: Lambda-Calculus (Alonzo Church) and Turing Machines (Alan Turing) provide the mechanism for formally defining an algorithm.</a:t>
+            </a:r>
+          </a:p>
+        </p:txBody>
+      </p:sp>
+      <p:sp>
+        <p:nvSpPr>
+          <p:cNvPr id="6" name="Content Placeholder 2">
+            <a:extLst>
+              <a:ext uri="{FF2B5EF4-FFF2-40B4-BE49-F238E27FC236}">
+                <a16:creationId xmlns:a16="http://schemas.microsoft.com/office/drawing/2014/main" id="{D1AB4AE0-9143-C34D-B965-4033C921D6B5}"/>
+              </a:ext>
+            </a:extLst>
+          </p:cNvPr>
+          <p:cNvSpPr txBox="1">
+            <a:spLocks/>
+          </p:cNvSpPr>
+          <p:nvPr/>
+        </p:nvSpPr>
+        <p:spPr>
+          <a:xfrm>
+            <a:off x="1141412" y="2888722"/>
+            <a:ext cx="9905999" cy="1089328"/>
+          </a:xfrm>
+          <a:prstGeom prst="rect">
+            <a:avLst/>
+          </a:prstGeom>
+          <a:noFill/>
+        </p:spPr>
+        <p:txBody>
+          <a:bodyPr vert="horz" lIns="91440" tIns="45720" rIns="91440" bIns="45720" rtlCol="0">
+            <a:normAutofit/>
+          </a:bodyPr>
+          <a:lstStyle>
+            <a:lvl1pPr marL="228600" indent="-228600" algn="l" defTabSz="914400" rtl="0" eaLnBrk="1" latinLnBrk="0" hangingPunct="1">
+              <a:lnSpc>
+                <a:spcPct val="120000"/>
+              </a:lnSpc>
+              <a:spcBef>
+                <a:spcPts val="1000"/>
+              </a:spcBef>
+              <a:buSzPct val="125000"/>
+              <a:buFont typeface="Arial" panose="020B0604020202020204" pitchFamily="34" charset="0"/>
+              <a:buChar char="•"/>
+              <a:defRPr sz="2400" kern="1200">
+                <a:solidFill>
+                  <a:schemeClr val="tx1"/>
+                </a:solidFill>
+                <a:latin typeface="+mn-lt"/>
+                <a:ea typeface="+mn-ea"/>
+                <a:cs typeface="+mn-cs"/>
+              </a:defRPr>
+            </a:lvl1pPr>
+            <a:lvl2pPr marL="685800" indent="-228600" algn="l" defTabSz="914400" rtl="0" eaLnBrk="1" latinLnBrk="0" hangingPunct="1">
+              <a:lnSpc>
+                <a:spcPct val="120000"/>
+              </a:lnSpc>
+              <a:spcBef>
+                <a:spcPts val="500"/>
+              </a:spcBef>
+              <a:buSzPct val="125000"/>
+              <a:buFont typeface="Arial" panose="020B0604020202020204" pitchFamily="34" charset="0"/>
+              <a:buChar char="•"/>
+              <a:defRPr sz="2000" kern="1200">
+                <a:solidFill>
+                  <a:schemeClr val="tx1"/>
+                </a:solidFill>
+                <a:latin typeface="+mn-lt"/>
+                <a:ea typeface="+mn-ea"/>
+                <a:cs typeface="+mn-cs"/>
+              </a:defRPr>
+            </a:lvl2pPr>
+            <a:lvl3pPr marL="1143000" indent="-228600" algn="l" defTabSz="914400" rtl="0" eaLnBrk="1" latinLnBrk="0" hangingPunct="1">
+              <a:lnSpc>
+                <a:spcPct val="120000"/>
+              </a:lnSpc>
+              <a:spcBef>
+                <a:spcPts val="500"/>
+              </a:spcBef>
+              <a:buSzPct val="125000"/>
+              <a:buFont typeface="Arial" panose="020B0604020202020204" pitchFamily="34" charset="0"/>
+              <a:buChar char="•"/>
+              <a:defRPr sz="1800" kern="1200">
+                <a:solidFill>
+                  <a:schemeClr val="tx1"/>
+                </a:solidFill>
+                <a:latin typeface="+mn-lt"/>
+                <a:ea typeface="+mn-ea"/>
+                <a:cs typeface="+mn-cs"/>
+              </a:defRPr>
+            </a:lvl3pPr>
+            <a:lvl4pPr marL="1600200" indent="-228600" algn="l" defTabSz="914400" rtl="0" eaLnBrk="1" latinLnBrk="0" hangingPunct="1">
+              <a:lnSpc>
+                <a:spcPct val="120000"/>
+              </a:lnSpc>
+              <a:spcBef>
+                <a:spcPts val="500"/>
+              </a:spcBef>
+              <a:buSzPct val="125000"/>
+              <a:buFont typeface="Arial" panose="020B0604020202020204" pitchFamily="34" charset="0"/>
+              <a:buChar char="•"/>
+              <a:defRPr sz="1600" kern="1200">
+                <a:solidFill>
+                  <a:schemeClr val="tx1"/>
+                </a:solidFill>
+                <a:latin typeface="+mn-lt"/>
+                <a:ea typeface="+mn-ea"/>
+                <a:cs typeface="+mn-cs"/>
+              </a:defRPr>
+            </a:lvl4pPr>
+            <a:lvl5pPr marL="2057400" indent="-228600" algn="l" defTabSz="914400" rtl="0" eaLnBrk="1" latinLnBrk="0" hangingPunct="1">
+              <a:lnSpc>
+                <a:spcPct val="120000"/>
+              </a:lnSpc>
+              <a:spcBef>
+                <a:spcPts val="500"/>
+              </a:spcBef>
+              <a:buSzPct val="125000"/>
+              <a:buFont typeface="Arial" panose="020B0604020202020204" pitchFamily="34" charset="0"/>
+              <a:buChar char="•"/>
+              <a:defRPr sz="1600" kern="1200">
+                <a:solidFill>
+                  <a:schemeClr val="tx1"/>
+                </a:solidFill>
+                <a:latin typeface="+mn-lt"/>
+                <a:ea typeface="+mn-ea"/>
+                <a:cs typeface="+mn-cs"/>
+              </a:defRPr>
+            </a:lvl5pPr>
+            <a:lvl6pPr marL="2514600" indent="-228600" algn="l" defTabSz="914400" rtl="0" eaLnBrk="1" latinLnBrk="0" hangingPunct="1">
+              <a:lnSpc>
+                <a:spcPct val="120000"/>
+              </a:lnSpc>
+              <a:spcBef>
+                <a:spcPts val="500"/>
+              </a:spcBef>
+              <a:buSzPct val="125000"/>
+              <a:buFont typeface="Arial" panose="020B0604020202020204" pitchFamily="34" charset="0"/>
+              <a:buChar char="•"/>
+              <a:defRPr sz="1400" kern="1200">
+                <a:solidFill>
+                  <a:schemeClr val="tx1"/>
+                </a:solidFill>
+                <a:latin typeface="+mn-lt"/>
+                <a:ea typeface="+mn-ea"/>
+                <a:cs typeface="+mn-cs"/>
+              </a:defRPr>
+            </a:lvl6pPr>
+            <a:lvl7pPr marL="2971800" indent="-228600" algn="l" defTabSz="914400" rtl="0" eaLnBrk="1" latinLnBrk="0" hangingPunct="1">
+              <a:lnSpc>
+                <a:spcPct val="120000"/>
+              </a:lnSpc>
+              <a:spcBef>
+                <a:spcPts val="500"/>
+              </a:spcBef>
+              <a:buSzPct val="125000"/>
+              <a:buFont typeface="Arial" panose="020B0604020202020204" pitchFamily="34" charset="0"/>
+              <a:buChar char="•"/>
+              <a:defRPr sz="1400" kern="1200">
+                <a:solidFill>
+                  <a:schemeClr val="tx1"/>
+                </a:solidFill>
+                <a:latin typeface="+mn-lt"/>
+                <a:ea typeface="+mn-ea"/>
+                <a:cs typeface="+mn-cs"/>
+              </a:defRPr>
+            </a:lvl7pPr>
+            <a:lvl8pPr marL="3429000" indent="-228600" algn="l" defTabSz="914400" rtl="0" eaLnBrk="1" latinLnBrk="0" hangingPunct="1">
+              <a:lnSpc>
+                <a:spcPct val="120000"/>
+              </a:lnSpc>
+              <a:spcBef>
+                <a:spcPts val="500"/>
+              </a:spcBef>
+              <a:buSzPct val="125000"/>
+              <a:buFont typeface="Arial" panose="020B0604020202020204" pitchFamily="34" charset="0"/>
+              <a:buChar char="•"/>
+              <a:defRPr sz="1400" kern="1200">
+                <a:solidFill>
+                  <a:schemeClr val="tx1"/>
+                </a:solidFill>
+                <a:latin typeface="+mn-lt"/>
+                <a:ea typeface="+mn-ea"/>
+                <a:cs typeface="+mn-cs"/>
+              </a:defRPr>
+            </a:lvl8pPr>
+            <a:lvl9pPr marL="3886200" indent="-228600" algn="l" defTabSz="914400" rtl="0" eaLnBrk="1" latinLnBrk="0" hangingPunct="1">
+              <a:lnSpc>
+                <a:spcPct val="120000"/>
+              </a:lnSpc>
+              <a:spcBef>
+                <a:spcPts val="500"/>
+              </a:spcBef>
+              <a:buSzPct val="125000"/>
+              <a:buFont typeface="Arial" panose="020B0604020202020204" pitchFamily="34" charset="0"/>
+              <a:buChar char="•"/>
+              <a:defRPr sz="1400" kern="1200">
+                <a:solidFill>
+                  <a:schemeClr val="tx1"/>
+                </a:solidFill>
+                <a:latin typeface="+mn-lt"/>
+                <a:ea typeface="+mn-ea"/>
+                <a:cs typeface="+mn-cs"/>
+              </a:defRPr>
+            </a:lvl9pPr>
+          </a:lstStyle>
+          <a:p>
+            <a:pPr marL="0" indent="0">
+              <a:buFont typeface="Arial" panose="020B0604020202020204" pitchFamily="34" charset="0"/>
+              <a:buNone/>
+            </a:pPr>
+            <a:r>
+              <a:rPr lang="en-US" dirty="0">
+                <a:solidFill>
+                  <a:schemeClr val="tx1">
+                    <a:lumMod val="95000"/>
+                  </a:schemeClr>
+                </a:solidFill>
+              </a:rPr>
+              <a:t>…</a:t>
+            </a:r>
+          </a:p>
+        </p:txBody>
+      </p:sp>
+      <p:pic>
+        <p:nvPicPr>
+          <p:cNvPr id="5" name="Picture 4">
+            <a:extLst>
+              <a:ext uri="{FF2B5EF4-FFF2-40B4-BE49-F238E27FC236}">
+                <a16:creationId xmlns:a16="http://schemas.microsoft.com/office/drawing/2014/main" id="{82427281-21C2-F74E-8C5E-4A73C2217996}"/>
+              </a:ext>
+            </a:extLst>
+          </p:cNvPr>
+          <p:cNvPicPr>
+            <a:picLocks noChangeAspect="1"/>
+          </p:cNvPicPr>
+          <p:nvPr/>
+        </p:nvPicPr>
+        <p:blipFill>
+          <a:blip r:embed="rId2"/>
+          <a:stretch>
+            <a:fillRect/>
+          </a:stretch>
+        </p:blipFill>
+        <p:spPr>
+          <a:xfrm>
+            <a:off x="1950645" y="4218073"/>
+            <a:ext cx="8001000" cy="1828800"/>
+          </a:xfrm>
+          <a:prstGeom prst="rect">
+            <a:avLst/>
+          </a:prstGeom>
+        </p:spPr>
+      </p:pic>
+    </p:spTree>
+    <p:extLst>
+      <p:ext uri="{BB962C8B-B14F-4D97-AF65-F5344CB8AC3E}">
+        <p14:creationId xmlns:p14="http://schemas.microsoft.com/office/powerpoint/2010/main" val="3680982836"/>
+      </p:ext>
+    </p:extLst>
+  </p:cSld>
+  <p:clrMapOvr>
+    <a:masterClrMapping/>
+  </p:clrMapOvr>
+</p:sld>
+</file>
+
+<file path=ppt/slides/slide29.xml><?xml version="1.0" encoding="utf-8"?>
+<p:sld xmlns:a="http://schemas.openxmlformats.org/drawingml/2006/main" xmlns:r="http://schemas.openxmlformats.org/officeDocument/2006/relationships" xmlns:p="http://schemas.openxmlformats.org/presentationml/2006/main">
+  <p:cSld>
+    <p:spTree>
+      <p:nvGrpSpPr>
+        <p:cNvPr id="1" name=""/>
+        <p:cNvGrpSpPr/>
+        <p:nvPr/>
+      </p:nvGrpSpPr>
+      <p:grpSpPr>
+        <a:xfrm>
+          <a:off x="0" y="0"/>
+          <a:ext cx="0" cy="0"/>
+          <a:chOff x="0" y="0"/>
+          <a:chExt cx="0" cy="0"/>
+        </a:xfrm>
+      </p:grpSpPr>
+      <p:sp>
+        <p:nvSpPr>
+          <p:cNvPr id="2" name="Title 1">
+            <a:extLst>
+              <a:ext uri="{FF2B5EF4-FFF2-40B4-BE49-F238E27FC236}">
+                <a16:creationId xmlns:a16="http://schemas.microsoft.com/office/drawing/2014/main" id="{D63C04CD-2329-4D47-84D9-12CB3EDD9F46}"/>
+              </a:ext>
+            </a:extLst>
+          </p:cNvPr>
+          <p:cNvSpPr>
+            <a:spLocks noGrp="1"/>
+          </p:cNvSpPr>
+          <p:nvPr>
+            <p:ph type="title"/>
+          </p:nvPr>
+        </p:nvSpPr>
+        <p:spPr>
+          <a:xfrm>
+            <a:off x="1141413" y="125537"/>
+            <a:ext cx="9905998" cy="860425"/>
+          </a:xfrm>
+        </p:spPr>
+        <p:txBody>
+          <a:bodyPr/>
+          <a:lstStyle/>
+          <a:p>
+            <a:pPr algn="ctr"/>
+            <a:r>
+              <a:rPr lang="en-US" dirty="0"/>
+              <a:t>Finding Polynomial Roots is Recognizable</a:t>
+            </a:r>
+          </a:p>
+        </p:txBody>
+      </p:sp>
+      <p:sp>
+        <p:nvSpPr>
+          <p:cNvPr id="3" name="Content Placeholder 2">
+            <a:extLst>
+              <a:ext uri="{FF2B5EF4-FFF2-40B4-BE49-F238E27FC236}">
+                <a16:creationId xmlns:a16="http://schemas.microsoft.com/office/drawing/2014/main" id="{14278F5F-F936-6145-9FF8-704886F1A386}"/>
+              </a:ext>
+            </a:extLst>
+          </p:cNvPr>
+          <p:cNvSpPr>
+            <a:spLocks noGrp="1"/>
+          </p:cNvSpPr>
+          <p:nvPr>
+            <p:ph idx="1"/>
+          </p:nvPr>
+        </p:nvSpPr>
+        <p:spPr>
+          <a:xfrm>
+            <a:off x="1141412" y="1559371"/>
+            <a:ext cx="9905999" cy="1089328"/>
+          </a:xfrm>
+          <a:solidFill>
+            <a:schemeClr val="tx1">
+              <a:lumMod val="95000"/>
+            </a:schemeClr>
+          </a:solidFill>
+        </p:spPr>
+        <p:txBody>
+          <a:bodyPr>
+            <a:normAutofit/>
+          </a:bodyPr>
+          <a:lstStyle/>
+          <a:p>
+            <a:pPr marL="0" indent="0">
+              <a:buNone/>
+            </a:pPr>
+            <a:r>
+              <a:rPr lang="en-US" b="1" i="1" u="sng" dirty="0">
+                <a:solidFill>
+                  <a:schemeClr val="bg1"/>
+                </a:solidFill>
+              </a:rPr>
+              <a:t>Show how to do it.</a:t>
+            </a:r>
+            <a:endParaRPr lang="en-US" dirty="0">
+              <a:solidFill>
+                <a:schemeClr val="bg1"/>
+              </a:solidFill>
+            </a:endParaRPr>
+          </a:p>
+        </p:txBody>
+      </p:sp>
+      <p:sp>
+        <p:nvSpPr>
+          <p:cNvPr id="6" name="Content Placeholder 2">
+            <a:extLst>
+              <a:ext uri="{FF2B5EF4-FFF2-40B4-BE49-F238E27FC236}">
+                <a16:creationId xmlns:a16="http://schemas.microsoft.com/office/drawing/2014/main" id="{D1AB4AE0-9143-C34D-B965-4033C921D6B5}"/>
+              </a:ext>
+            </a:extLst>
+          </p:cNvPr>
+          <p:cNvSpPr txBox="1">
+            <a:spLocks/>
+          </p:cNvSpPr>
+          <p:nvPr/>
+        </p:nvSpPr>
+        <p:spPr>
+          <a:xfrm>
+            <a:off x="1141412" y="2888722"/>
+            <a:ext cx="9905999" cy="1089328"/>
+          </a:xfrm>
+          <a:prstGeom prst="rect">
+            <a:avLst/>
+          </a:prstGeom>
+          <a:noFill/>
+        </p:spPr>
+        <p:txBody>
+          <a:bodyPr vert="horz" lIns="91440" tIns="45720" rIns="91440" bIns="45720" rtlCol="0">
+            <a:normAutofit/>
+          </a:bodyPr>
+          <a:lstStyle>
+            <a:lvl1pPr marL="228600" indent="-228600" algn="l" defTabSz="914400" rtl="0" eaLnBrk="1" latinLnBrk="0" hangingPunct="1">
+              <a:lnSpc>
+                <a:spcPct val="120000"/>
+              </a:lnSpc>
+              <a:spcBef>
+                <a:spcPts val="1000"/>
+              </a:spcBef>
+              <a:buSzPct val="125000"/>
+              <a:buFont typeface="Arial" panose="020B0604020202020204" pitchFamily="34" charset="0"/>
+              <a:buChar char="•"/>
+              <a:defRPr sz="2400" kern="1200">
+                <a:solidFill>
+                  <a:schemeClr val="tx1"/>
+                </a:solidFill>
+                <a:latin typeface="+mn-lt"/>
+                <a:ea typeface="+mn-ea"/>
+                <a:cs typeface="+mn-cs"/>
+              </a:defRPr>
+            </a:lvl1pPr>
+            <a:lvl2pPr marL="685800" indent="-228600" algn="l" defTabSz="914400" rtl="0" eaLnBrk="1" latinLnBrk="0" hangingPunct="1">
+              <a:lnSpc>
+                <a:spcPct val="120000"/>
+              </a:lnSpc>
+              <a:spcBef>
+                <a:spcPts val="500"/>
+              </a:spcBef>
+              <a:buSzPct val="125000"/>
+              <a:buFont typeface="Arial" panose="020B0604020202020204" pitchFamily="34" charset="0"/>
+              <a:buChar char="•"/>
+              <a:defRPr sz="2000" kern="1200">
+                <a:solidFill>
+                  <a:schemeClr val="tx1"/>
+                </a:solidFill>
+                <a:latin typeface="+mn-lt"/>
+                <a:ea typeface="+mn-ea"/>
+                <a:cs typeface="+mn-cs"/>
+              </a:defRPr>
+            </a:lvl2pPr>
+            <a:lvl3pPr marL="1143000" indent="-228600" algn="l" defTabSz="914400" rtl="0" eaLnBrk="1" latinLnBrk="0" hangingPunct="1">
+              <a:lnSpc>
+                <a:spcPct val="120000"/>
+              </a:lnSpc>
+              <a:spcBef>
+                <a:spcPts val="500"/>
+              </a:spcBef>
+              <a:buSzPct val="125000"/>
+              <a:buFont typeface="Arial" panose="020B0604020202020204" pitchFamily="34" charset="0"/>
+              <a:buChar char="•"/>
+              <a:defRPr sz="1800" kern="1200">
+                <a:solidFill>
+                  <a:schemeClr val="tx1"/>
+                </a:solidFill>
+                <a:latin typeface="+mn-lt"/>
+                <a:ea typeface="+mn-ea"/>
+                <a:cs typeface="+mn-cs"/>
+              </a:defRPr>
+            </a:lvl3pPr>
+            <a:lvl4pPr marL="1600200" indent="-228600" algn="l" defTabSz="914400" rtl="0" eaLnBrk="1" latinLnBrk="0" hangingPunct="1">
+              <a:lnSpc>
+                <a:spcPct val="120000"/>
+              </a:lnSpc>
+              <a:spcBef>
+                <a:spcPts val="500"/>
+              </a:spcBef>
+              <a:buSzPct val="125000"/>
+              <a:buFont typeface="Arial" panose="020B0604020202020204" pitchFamily="34" charset="0"/>
+              <a:buChar char="•"/>
+              <a:defRPr sz="1600" kern="1200">
+                <a:solidFill>
+                  <a:schemeClr val="tx1"/>
+                </a:solidFill>
+                <a:latin typeface="+mn-lt"/>
+                <a:ea typeface="+mn-ea"/>
+                <a:cs typeface="+mn-cs"/>
+              </a:defRPr>
+            </a:lvl4pPr>
+            <a:lvl5pPr marL="2057400" indent="-228600" algn="l" defTabSz="914400" rtl="0" eaLnBrk="1" latinLnBrk="0" hangingPunct="1">
+              <a:lnSpc>
+                <a:spcPct val="120000"/>
+              </a:lnSpc>
+              <a:spcBef>
+                <a:spcPts val="500"/>
+              </a:spcBef>
+              <a:buSzPct val="125000"/>
+              <a:buFont typeface="Arial" panose="020B0604020202020204" pitchFamily="34" charset="0"/>
+              <a:buChar char="•"/>
+              <a:defRPr sz="1600" kern="1200">
+                <a:solidFill>
+                  <a:schemeClr val="tx1"/>
+                </a:solidFill>
+                <a:latin typeface="+mn-lt"/>
+                <a:ea typeface="+mn-ea"/>
+                <a:cs typeface="+mn-cs"/>
+              </a:defRPr>
+            </a:lvl5pPr>
+            <a:lvl6pPr marL="2514600" indent="-228600" algn="l" defTabSz="914400" rtl="0" eaLnBrk="1" latinLnBrk="0" hangingPunct="1">
+              <a:lnSpc>
+                <a:spcPct val="120000"/>
+              </a:lnSpc>
+              <a:spcBef>
+                <a:spcPts val="500"/>
+              </a:spcBef>
+              <a:buSzPct val="125000"/>
+              <a:buFont typeface="Arial" panose="020B0604020202020204" pitchFamily="34" charset="0"/>
+              <a:buChar char="•"/>
+              <a:defRPr sz="1400" kern="1200">
+                <a:solidFill>
+                  <a:schemeClr val="tx1"/>
+                </a:solidFill>
+                <a:latin typeface="+mn-lt"/>
+                <a:ea typeface="+mn-ea"/>
+                <a:cs typeface="+mn-cs"/>
+              </a:defRPr>
+            </a:lvl6pPr>
+            <a:lvl7pPr marL="2971800" indent="-228600" algn="l" defTabSz="914400" rtl="0" eaLnBrk="1" latinLnBrk="0" hangingPunct="1">
+              <a:lnSpc>
+                <a:spcPct val="120000"/>
+              </a:lnSpc>
+              <a:spcBef>
+                <a:spcPts val="500"/>
+              </a:spcBef>
+              <a:buSzPct val="125000"/>
+              <a:buFont typeface="Arial" panose="020B0604020202020204" pitchFamily="34" charset="0"/>
+              <a:buChar char="•"/>
+              <a:defRPr sz="1400" kern="1200">
+                <a:solidFill>
+                  <a:schemeClr val="tx1"/>
+                </a:solidFill>
+                <a:latin typeface="+mn-lt"/>
+                <a:ea typeface="+mn-ea"/>
+                <a:cs typeface="+mn-cs"/>
+              </a:defRPr>
+            </a:lvl7pPr>
+            <a:lvl8pPr marL="3429000" indent="-228600" algn="l" defTabSz="914400" rtl="0" eaLnBrk="1" latinLnBrk="0" hangingPunct="1">
+              <a:lnSpc>
+                <a:spcPct val="120000"/>
+              </a:lnSpc>
+              <a:spcBef>
+                <a:spcPts val="500"/>
+              </a:spcBef>
+              <a:buSzPct val="125000"/>
+              <a:buFont typeface="Arial" panose="020B0604020202020204" pitchFamily="34" charset="0"/>
+              <a:buChar char="•"/>
+              <a:defRPr sz="1400" kern="1200">
+                <a:solidFill>
+                  <a:schemeClr val="tx1"/>
+                </a:solidFill>
+                <a:latin typeface="+mn-lt"/>
+                <a:ea typeface="+mn-ea"/>
+                <a:cs typeface="+mn-cs"/>
+              </a:defRPr>
+            </a:lvl8pPr>
+            <a:lvl9pPr marL="3886200" indent="-228600" algn="l" defTabSz="914400" rtl="0" eaLnBrk="1" latinLnBrk="0" hangingPunct="1">
+              <a:lnSpc>
+                <a:spcPct val="120000"/>
+              </a:lnSpc>
+              <a:spcBef>
+                <a:spcPts val="500"/>
+              </a:spcBef>
+              <a:buSzPct val="125000"/>
+              <a:buFont typeface="Arial" panose="020B0604020202020204" pitchFamily="34" charset="0"/>
+              <a:buChar char="•"/>
+              <a:defRPr sz="1400" kern="1200">
+                <a:solidFill>
+                  <a:schemeClr val="tx1"/>
+                </a:solidFill>
+                <a:latin typeface="+mn-lt"/>
+                <a:ea typeface="+mn-ea"/>
+                <a:cs typeface="+mn-cs"/>
+              </a:defRPr>
+            </a:lvl9pPr>
+          </a:lstStyle>
+          <a:p>
+            <a:pPr marL="0" indent="0">
+              <a:buFont typeface="Arial" panose="020B0604020202020204" pitchFamily="34" charset="0"/>
+              <a:buNone/>
+            </a:pPr>
+            <a:r>
+              <a:rPr lang="en-US" dirty="0">
+                <a:solidFill>
+                  <a:schemeClr val="tx1">
+                    <a:lumMod val="95000"/>
+                  </a:schemeClr>
+                </a:solidFill>
+              </a:rPr>
+              <a:t>Decidable for one variable. Famously not decidable for multiple variables.</a:t>
+            </a:r>
+          </a:p>
+        </p:txBody>
+      </p:sp>
+    </p:spTree>
+    <p:extLst>
+      <p:ext uri="{BB962C8B-B14F-4D97-AF65-F5344CB8AC3E}">
+        <p14:creationId xmlns:p14="http://schemas.microsoft.com/office/powerpoint/2010/main" val="2415731417"/>
+      </p:ext>
+    </p:extLst>
+  </p:cSld>
+  <p:clrMapOvr>
+    <a:masterClrMapping/>
+  </p:clrMapOvr>
+</p:sld>
+</file>
+
 <file path=ppt/slides/slide3.xml><?xml version="1.0" encoding="utf-8"?>
 <p:sld xmlns:a="http://schemas.openxmlformats.org/drawingml/2006/main" xmlns:r="http://schemas.openxmlformats.org/officeDocument/2006/relationships" xmlns:p="http://schemas.openxmlformats.org/presentationml/2006/main">
   <p:cSld>
@@ -18734,6 +19770,896 @@
     <p:extLst>
       <p:ext uri="{BB962C8B-B14F-4D97-AF65-F5344CB8AC3E}">
         <p14:creationId xmlns:p14="http://schemas.microsoft.com/office/powerpoint/2010/main" val="4149752791"/>
+      </p:ext>
+    </p:extLst>
+  </p:cSld>
+  <p:clrMapOvr>
+    <a:masterClrMapping/>
+  </p:clrMapOvr>
+</p:sld>
+</file>
+
+<file path=ppt/slides/slide30.xml><?xml version="1.0" encoding="utf-8"?>
+<p:sld xmlns:a="http://schemas.openxmlformats.org/drawingml/2006/main" xmlns:r="http://schemas.openxmlformats.org/officeDocument/2006/relationships" xmlns:p="http://schemas.openxmlformats.org/presentationml/2006/main">
+  <p:cSld>
+    <p:spTree>
+      <p:nvGrpSpPr>
+        <p:cNvPr id="1" name=""/>
+        <p:cNvGrpSpPr/>
+        <p:nvPr/>
+      </p:nvGrpSpPr>
+      <p:grpSpPr>
+        <a:xfrm>
+          <a:off x="0" y="0"/>
+          <a:ext cx="0" cy="0"/>
+          <a:chOff x="0" y="0"/>
+          <a:chExt cx="0" cy="0"/>
+        </a:xfrm>
+      </p:grpSpPr>
+      <p:sp>
+        <p:nvSpPr>
+          <p:cNvPr id="2" name="Title 1">
+            <a:extLst>
+              <a:ext uri="{FF2B5EF4-FFF2-40B4-BE49-F238E27FC236}">
+                <a16:creationId xmlns:a16="http://schemas.microsoft.com/office/drawing/2014/main" id="{D63C04CD-2329-4D47-84D9-12CB3EDD9F46}"/>
+              </a:ext>
+            </a:extLst>
+          </p:cNvPr>
+          <p:cNvSpPr>
+            <a:spLocks noGrp="1"/>
+          </p:cNvSpPr>
+          <p:nvPr>
+            <p:ph type="title"/>
+          </p:nvPr>
+        </p:nvSpPr>
+        <p:spPr>
+          <a:xfrm>
+            <a:off x="1141413" y="125537"/>
+            <a:ext cx="9905998" cy="860425"/>
+          </a:xfrm>
+        </p:spPr>
+        <p:txBody>
+          <a:bodyPr/>
+          <a:lstStyle/>
+          <a:p>
+            <a:pPr algn="ctr"/>
+            <a:r>
+              <a:rPr lang="en-US" dirty="0"/>
+              <a:t>Example TM with Algorithmic Description</a:t>
+            </a:r>
+          </a:p>
+        </p:txBody>
+      </p:sp>
+      <mc:AlternateContent xmlns:mc="http://schemas.openxmlformats.org/markup-compatibility/2006">
+        <mc:Choice xmlns:a14="http://schemas.microsoft.com/office/drawing/2010/main" Requires="a14">
+          <p:sp>
+            <p:nvSpPr>
+              <p:cNvPr id="3" name="Content Placeholder 2">
+                <a:extLst>
+                  <a:ext uri="{FF2B5EF4-FFF2-40B4-BE49-F238E27FC236}">
+                    <a16:creationId xmlns:a16="http://schemas.microsoft.com/office/drawing/2014/main" id="{14278F5F-F936-6145-9FF8-704886F1A386}"/>
+                  </a:ext>
+                </a:extLst>
+              </p:cNvPr>
+              <p:cNvSpPr>
+                <a:spLocks noGrp="1"/>
+              </p:cNvSpPr>
+              <p:nvPr>
+                <p:ph idx="1"/>
+              </p:nvPr>
+            </p:nvSpPr>
+            <p:spPr>
+              <a:xfrm>
+                <a:off x="1141412" y="1559371"/>
+                <a:ext cx="9905999" cy="1089328"/>
+              </a:xfrm>
+              <a:solidFill>
+                <a:schemeClr val="tx1">
+                  <a:lumMod val="95000"/>
+                </a:schemeClr>
+              </a:solidFill>
+            </p:spPr>
+            <p:txBody>
+              <a:bodyPr>
+                <a:normAutofit/>
+              </a:bodyPr>
+              <a:lstStyle/>
+              <a:p>
+                <a:pPr marL="0" indent="0">
+                  <a:buNone/>
+                </a:pPr>
+                <a:r>
+                  <a:rPr lang="en-US" b="1" i="1" u="sng" dirty="0">
+                    <a:solidFill>
+                      <a:schemeClr val="bg1"/>
+                    </a:solidFill>
+                  </a:rPr>
+                  <a:t>Use an algorithm to describe the following:</a:t>
+                </a:r>
+                <a:r>
+                  <a:rPr lang="en-US" dirty="0">
+                    <a:solidFill>
+                      <a:schemeClr val="bg1"/>
+                    </a:solidFill>
+                  </a:rPr>
+                  <a:t> </a:t>
+                </a:r>
+                <a14:m>
+                  <m:oMath xmlns:m="http://schemas.openxmlformats.org/officeDocument/2006/math">
+                    <m:r>
+                      <a:rPr lang="en-US" b="0" i="1" smtClean="0">
+                        <a:solidFill>
+                          <a:schemeClr val="bg1"/>
+                        </a:solidFill>
+                        <a:latin typeface="Cambria Math" panose="02040503050406030204" pitchFamily="18" charset="0"/>
+                      </a:rPr>
+                      <m:t>𝐴</m:t>
+                    </m:r>
+                    <m:r>
+                      <a:rPr lang="en-US" b="0" i="1" smtClean="0">
+                        <a:solidFill>
+                          <a:schemeClr val="bg1"/>
+                        </a:solidFill>
+                        <a:latin typeface="Cambria Math" panose="02040503050406030204" pitchFamily="18" charset="0"/>
+                      </a:rPr>
+                      <m:t>=</m:t>
+                    </m:r>
+                    <m:d>
+                      <m:dPr>
+                        <m:begChr m:val="{"/>
+                        <m:endChr m:val="|"/>
+                        <m:ctrlPr>
+                          <a:rPr lang="en-US" b="0" i="1" smtClean="0">
+                            <a:solidFill>
+                              <a:schemeClr val="bg1"/>
+                            </a:solidFill>
+                            <a:latin typeface="Cambria Math" panose="02040503050406030204" pitchFamily="18" charset="0"/>
+                          </a:rPr>
+                        </m:ctrlPr>
+                      </m:dPr>
+                      <m:e>
+                        <m:r>
+                          <a:rPr lang="en-US" b="0" i="1" smtClean="0">
+                            <a:solidFill>
+                              <a:schemeClr val="bg1"/>
+                            </a:solidFill>
+                            <a:latin typeface="Cambria Math" panose="02040503050406030204" pitchFamily="18" charset="0"/>
+                          </a:rPr>
+                          <m:t>𝐺</m:t>
+                        </m:r>
+                        <m:r>
+                          <a:rPr lang="en-US" b="0" i="1" smtClean="0">
+                            <a:solidFill>
+                              <a:schemeClr val="bg1"/>
+                            </a:solidFill>
+                            <a:latin typeface="Cambria Math" panose="02040503050406030204" pitchFamily="18" charset="0"/>
+                          </a:rPr>
+                          <m:t> </m:t>
+                        </m:r>
+                      </m:e>
+                    </m:d>
+                    <m:r>
+                      <a:rPr lang="en-US" b="0" i="1" smtClean="0">
+                        <a:solidFill>
+                          <a:schemeClr val="bg1"/>
+                        </a:solidFill>
+                        <a:latin typeface="Cambria Math" panose="02040503050406030204" pitchFamily="18" charset="0"/>
+                      </a:rPr>
+                      <m:t> </m:t>
+                    </m:r>
+                    <m:r>
+                      <a:rPr lang="en-US" b="0" i="1" smtClean="0">
+                        <a:solidFill>
+                          <a:schemeClr val="bg1"/>
+                        </a:solidFill>
+                        <a:latin typeface="Cambria Math" panose="02040503050406030204" pitchFamily="18" charset="0"/>
+                      </a:rPr>
+                      <m:t>𝐺</m:t>
+                    </m:r>
+                    <m:r>
+                      <a:rPr lang="en-US" b="0" i="1" smtClean="0">
+                        <a:solidFill>
+                          <a:schemeClr val="bg1"/>
+                        </a:solidFill>
+                        <a:latin typeface="Cambria Math" panose="02040503050406030204" pitchFamily="18" charset="0"/>
+                      </a:rPr>
+                      <m:t> </m:t>
+                    </m:r>
+                    <m:r>
+                      <a:rPr lang="en-US" b="0" i="1" smtClean="0">
+                        <a:solidFill>
+                          <a:schemeClr val="bg1"/>
+                        </a:solidFill>
+                        <a:latin typeface="Cambria Math" panose="02040503050406030204" pitchFamily="18" charset="0"/>
+                      </a:rPr>
+                      <m:t>𝑖𝑠</m:t>
+                    </m:r>
+                    <m:r>
+                      <a:rPr lang="en-US" b="0" i="1" smtClean="0">
+                        <a:solidFill>
+                          <a:schemeClr val="bg1"/>
+                        </a:solidFill>
+                        <a:latin typeface="Cambria Math" panose="02040503050406030204" pitchFamily="18" charset="0"/>
+                      </a:rPr>
+                      <m:t> </m:t>
+                    </m:r>
+                    <m:r>
+                      <a:rPr lang="en-US" b="0" i="1" smtClean="0">
+                        <a:solidFill>
+                          <a:schemeClr val="bg1"/>
+                        </a:solidFill>
+                        <a:latin typeface="Cambria Math" panose="02040503050406030204" pitchFamily="18" charset="0"/>
+                      </a:rPr>
+                      <m:t>𝑎</m:t>
+                    </m:r>
+                    <m:r>
+                      <a:rPr lang="en-US" b="0" i="1" smtClean="0">
+                        <a:solidFill>
+                          <a:schemeClr val="bg1"/>
+                        </a:solidFill>
+                        <a:latin typeface="Cambria Math" panose="02040503050406030204" pitchFamily="18" charset="0"/>
+                      </a:rPr>
+                      <m:t> </m:t>
+                    </m:r>
+                    <m:r>
+                      <a:rPr lang="en-US" b="0" i="1" smtClean="0">
+                        <a:solidFill>
+                          <a:schemeClr val="bg1"/>
+                        </a:solidFill>
+                        <a:latin typeface="Cambria Math" panose="02040503050406030204" pitchFamily="18" charset="0"/>
+                      </a:rPr>
+                      <m:t>𝑐𝑜𝑛𝑛𝑒𝑐𝑡𝑒𝑑</m:t>
+                    </m:r>
+                    <m:r>
+                      <a:rPr lang="en-US" b="0" i="1" smtClean="0">
+                        <a:solidFill>
+                          <a:schemeClr val="bg1"/>
+                        </a:solidFill>
+                        <a:latin typeface="Cambria Math" panose="02040503050406030204" pitchFamily="18" charset="0"/>
+                      </a:rPr>
+                      <m:t> </m:t>
+                    </m:r>
+                    <m:r>
+                      <a:rPr lang="en-US" b="0" i="1" smtClean="0">
+                        <a:solidFill>
+                          <a:schemeClr val="bg1"/>
+                        </a:solidFill>
+                        <a:latin typeface="Cambria Math" panose="02040503050406030204" pitchFamily="18" charset="0"/>
+                      </a:rPr>
+                      <m:t>𝑔𝑟𝑎𝑝h</m:t>
+                    </m:r>
+                    <m:r>
+                      <a:rPr lang="en-US" b="0" i="1" smtClean="0">
+                        <a:solidFill>
+                          <a:schemeClr val="bg1"/>
+                        </a:solidFill>
+                        <a:latin typeface="Cambria Math" panose="02040503050406030204" pitchFamily="18" charset="0"/>
+                      </a:rPr>
+                      <m:t>}</m:t>
+                    </m:r>
+                  </m:oMath>
+                </a14:m>
+                <a:endParaRPr lang="en-US" dirty="0">
+                  <a:solidFill>
+                    <a:schemeClr val="bg1"/>
+                  </a:solidFill>
+                </a:endParaRPr>
+              </a:p>
+            </p:txBody>
+          </p:sp>
+        </mc:Choice>
+        <mc:Fallback>
+          <p:sp>
+            <p:nvSpPr>
+              <p:cNvPr id="3" name="Content Placeholder 2">
+                <a:extLst>
+                  <a:ext uri="{FF2B5EF4-FFF2-40B4-BE49-F238E27FC236}">
+                    <a16:creationId xmlns:a16="http://schemas.microsoft.com/office/drawing/2014/main" id="{14278F5F-F936-6145-9FF8-704886F1A386}"/>
+                  </a:ext>
+                </a:extLst>
+              </p:cNvPr>
+              <p:cNvSpPr>
+                <a:spLocks noGrp="1" noRot="1" noChangeAspect="1" noMove="1" noResize="1" noEditPoints="1" noAdjustHandles="1" noChangeArrowheads="1" noChangeShapeType="1" noTextEdit="1"/>
+              </p:cNvSpPr>
+              <p:nvPr>
+                <p:ph idx="1"/>
+              </p:nvPr>
+            </p:nvSpPr>
+            <p:spPr>
+              <a:xfrm>
+                <a:off x="1141412" y="1559371"/>
+                <a:ext cx="9905999" cy="1089328"/>
+              </a:xfrm>
+              <a:blipFill>
+                <a:blip r:embed="rId2"/>
+                <a:stretch>
+                  <a:fillRect l="-896" t="-1149"/>
+                </a:stretch>
+              </a:blipFill>
+            </p:spPr>
+            <p:txBody>
+              <a:bodyPr/>
+              <a:lstStyle/>
+              <a:p>
+                <a:r>
+                  <a:rPr lang="en-US">
+                    <a:noFill/>
+                  </a:rPr>
+                  <a:t> </a:t>
+                </a:r>
+              </a:p>
+            </p:txBody>
+          </p:sp>
+        </mc:Fallback>
+      </mc:AlternateContent>
+      <p:sp>
+        <p:nvSpPr>
+          <p:cNvPr id="6" name="Content Placeholder 2">
+            <a:extLst>
+              <a:ext uri="{FF2B5EF4-FFF2-40B4-BE49-F238E27FC236}">
+                <a16:creationId xmlns:a16="http://schemas.microsoft.com/office/drawing/2014/main" id="{D1AB4AE0-9143-C34D-B965-4033C921D6B5}"/>
+              </a:ext>
+            </a:extLst>
+          </p:cNvPr>
+          <p:cNvSpPr txBox="1">
+            <a:spLocks/>
+          </p:cNvSpPr>
+          <p:nvPr/>
+        </p:nvSpPr>
+        <p:spPr>
+          <a:xfrm>
+            <a:off x="1141412" y="2888722"/>
+            <a:ext cx="9905999" cy="1089328"/>
+          </a:xfrm>
+          <a:prstGeom prst="rect">
+            <a:avLst/>
+          </a:prstGeom>
+          <a:noFill/>
+        </p:spPr>
+        <p:txBody>
+          <a:bodyPr vert="horz" lIns="91440" tIns="45720" rIns="91440" bIns="45720" rtlCol="0">
+            <a:normAutofit/>
+          </a:bodyPr>
+          <a:lstStyle>
+            <a:lvl1pPr marL="228600" indent="-228600" algn="l" defTabSz="914400" rtl="0" eaLnBrk="1" latinLnBrk="0" hangingPunct="1">
+              <a:lnSpc>
+                <a:spcPct val="120000"/>
+              </a:lnSpc>
+              <a:spcBef>
+                <a:spcPts val="1000"/>
+              </a:spcBef>
+              <a:buSzPct val="125000"/>
+              <a:buFont typeface="Arial" panose="020B0604020202020204" pitchFamily="34" charset="0"/>
+              <a:buChar char="•"/>
+              <a:defRPr sz="2400" kern="1200">
+                <a:solidFill>
+                  <a:schemeClr val="tx1"/>
+                </a:solidFill>
+                <a:latin typeface="+mn-lt"/>
+                <a:ea typeface="+mn-ea"/>
+                <a:cs typeface="+mn-cs"/>
+              </a:defRPr>
+            </a:lvl1pPr>
+            <a:lvl2pPr marL="685800" indent="-228600" algn="l" defTabSz="914400" rtl="0" eaLnBrk="1" latinLnBrk="0" hangingPunct="1">
+              <a:lnSpc>
+                <a:spcPct val="120000"/>
+              </a:lnSpc>
+              <a:spcBef>
+                <a:spcPts val="500"/>
+              </a:spcBef>
+              <a:buSzPct val="125000"/>
+              <a:buFont typeface="Arial" panose="020B0604020202020204" pitchFamily="34" charset="0"/>
+              <a:buChar char="•"/>
+              <a:defRPr sz="2000" kern="1200">
+                <a:solidFill>
+                  <a:schemeClr val="tx1"/>
+                </a:solidFill>
+                <a:latin typeface="+mn-lt"/>
+                <a:ea typeface="+mn-ea"/>
+                <a:cs typeface="+mn-cs"/>
+              </a:defRPr>
+            </a:lvl2pPr>
+            <a:lvl3pPr marL="1143000" indent="-228600" algn="l" defTabSz="914400" rtl="0" eaLnBrk="1" latinLnBrk="0" hangingPunct="1">
+              <a:lnSpc>
+                <a:spcPct val="120000"/>
+              </a:lnSpc>
+              <a:spcBef>
+                <a:spcPts val="500"/>
+              </a:spcBef>
+              <a:buSzPct val="125000"/>
+              <a:buFont typeface="Arial" panose="020B0604020202020204" pitchFamily="34" charset="0"/>
+              <a:buChar char="•"/>
+              <a:defRPr sz="1800" kern="1200">
+                <a:solidFill>
+                  <a:schemeClr val="tx1"/>
+                </a:solidFill>
+                <a:latin typeface="+mn-lt"/>
+                <a:ea typeface="+mn-ea"/>
+                <a:cs typeface="+mn-cs"/>
+              </a:defRPr>
+            </a:lvl3pPr>
+            <a:lvl4pPr marL="1600200" indent="-228600" algn="l" defTabSz="914400" rtl="0" eaLnBrk="1" latinLnBrk="0" hangingPunct="1">
+              <a:lnSpc>
+                <a:spcPct val="120000"/>
+              </a:lnSpc>
+              <a:spcBef>
+                <a:spcPts val="500"/>
+              </a:spcBef>
+              <a:buSzPct val="125000"/>
+              <a:buFont typeface="Arial" panose="020B0604020202020204" pitchFamily="34" charset="0"/>
+              <a:buChar char="•"/>
+              <a:defRPr sz="1600" kern="1200">
+                <a:solidFill>
+                  <a:schemeClr val="tx1"/>
+                </a:solidFill>
+                <a:latin typeface="+mn-lt"/>
+                <a:ea typeface="+mn-ea"/>
+                <a:cs typeface="+mn-cs"/>
+              </a:defRPr>
+            </a:lvl4pPr>
+            <a:lvl5pPr marL="2057400" indent="-228600" algn="l" defTabSz="914400" rtl="0" eaLnBrk="1" latinLnBrk="0" hangingPunct="1">
+              <a:lnSpc>
+                <a:spcPct val="120000"/>
+              </a:lnSpc>
+              <a:spcBef>
+                <a:spcPts val="500"/>
+              </a:spcBef>
+              <a:buSzPct val="125000"/>
+              <a:buFont typeface="Arial" panose="020B0604020202020204" pitchFamily="34" charset="0"/>
+              <a:buChar char="•"/>
+              <a:defRPr sz="1600" kern="1200">
+                <a:solidFill>
+                  <a:schemeClr val="tx1"/>
+                </a:solidFill>
+                <a:latin typeface="+mn-lt"/>
+                <a:ea typeface="+mn-ea"/>
+                <a:cs typeface="+mn-cs"/>
+              </a:defRPr>
+            </a:lvl5pPr>
+            <a:lvl6pPr marL="2514600" indent="-228600" algn="l" defTabSz="914400" rtl="0" eaLnBrk="1" latinLnBrk="0" hangingPunct="1">
+              <a:lnSpc>
+                <a:spcPct val="120000"/>
+              </a:lnSpc>
+              <a:spcBef>
+                <a:spcPts val="500"/>
+              </a:spcBef>
+              <a:buSzPct val="125000"/>
+              <a:buFont typeface="Arial" panose="020B0604020202020204" pitchFamily="34" charset="0"/>
+              <a:buChar char="•"/>
+              <a:defRPr sz="1400" kern="1200">
+                <a:solidFill>
+                  <a:schemeClr val="tx1"/>
+                </a:solidFill>
+                <a:latin typeface="+mn-lt"/>
+                <a:ea typeface="+mn-ea"/>
+                <a:cs typeface="+mn-cs"/>
+              </a:defRPr>
+            </a:lvl6pPr>
+            <a:lvl7pPr marL="2971800" indent="-228600" algn="l" defTabSz="914400" rtl="0" eaLnBrk="1" latinLnBrk="0" hangingPunct="1">
+              <a:lnSpc>
+                <a:spcPct val="120000"/>
+              </a:lnSpc>
+              <a:spcBef>
+                <a:spcPts val="500"/>
+              </a:spcBef>
+              <a:buSzPct val="125000"/>
+              <a:buFont typeface="Arial" panose="020B0604020202020204" pitchFamily="34" charset="0"/>
+              <a:buChar char="•"/>
+              <a:defRPr sz="1400" kern="1200">
+                <a:solidFill>
+                  <a:schemeClr val="tx1"/>
+                </a:solidFill>
+                <a:latin typeface="+mn-lt"/>
+                <a:ea typeface="+mn-ea"/>
+                <a:cs typeface="+mn-cs"/>
+              </a:defRPr>
+            </a:lvl7pPr>
+            <a:lvl8pPr marL="3429000" indent="-228600" algn="l" defTabSz="914400" rtl="0" eaLnBrk="1" latinLnBrk="0" hangingPunct="1">
+              <a:lnSpc>
+                <a:spcPct val="120000"/>
+              </a:lnSpc>
+              <a:spcBef>
+                <a:spcPts val="500"/>
+              </a:spcBef>
+              <a:buSzPct val="125000"/>
+              <a:buFont typeface="Arial" panose="020B0604020202020204" pitchFamily="34" charset="0"/>
+              <a:buChar char="•"/>
+              <a:defRPr sz="1400" kern="1200">
+                <a:solidFill>
+                  <a:schemeClr val="tx1"/>
+                </a:solidFill>
+                <a:latin typeface="+mn-lt"/>
+                <a:ea typeface="+mn-ea"/>
+                <a:cs typeface="+mn-cs"/>
+              </a:defRPr>
+            </a:lvl8pPr>
+            <a:lvl9pPr marL="3886200" indent="-228600" algn="l" defTabSz="914400" rtl="0" eaLnBrk="1" latinLnBrk="0" hangingPunct="1">
+              <a:lnSpc>
+                <a:spcPct val="120000"/>
+              </a:lnSpc>
+              <a:spcBef>
+                <a:spcPts val="500"/>
+              </a:spcBef>
+              <a:buSzPct val="125000"/>
+              <a:buFont typeface="Arial" panose="020B0604020202020204" pitchFamily="34" charset="0"/>
+              <a:buChar char="•"/>
+              <a:defRPr sz="1400" kern="1200">
+                <a:solidFill>
+                  <a:schemeClr val="tx1"/>
+                </a:solidFill>
+                <a:latin typeface="+mn-lt"/>
+                <a:ea typeface="+mn-ea"/>
+                <a:cs typeface="+mn-cs"/>
+              </a:defRPr>
+            </a:lvl9pPr>
+          </a:lstStyle>
+          <a:p>
+            <a:pPr marL="0" indent="0">
+              <a:buFont typeface="Arial" panose="020B0604020202020204" pitchFamily="34" charset="0"/>
+              <a:buNone/>
+            </a:pPr>
+            <a:r>
+              <a:rPr lang="en-US" dirty="0">
+                <a:solidFill>
+                  <a:schemeClr val="tx1">
+                    <a:lumMod val="95000"/>
+                  </a:schemeClr>
+                </a:solidFill>
+              </a:rPr>
+              <a:t>Decidable for one variable. Famously not decidable for multiple variables.</a:t>
+            </a:r>
+          </a:p>
+        </p:txBody>
+      </p:sp>
+      <p:pic>
+        <p:nvPicPr>
+          <p:cNvPr id="5" name="Picture 4">
+            <a:extLst>
+              <a:ext uri="{FF2B5EF4-FFF2-40B4-BE49-F238E27FC236}">
+                <a16:creationId xmlns:a16="http://schemas.microsoft.com/office/drawing/2014/main" id="{EDCEB0C8-6A3D-FF48-9692-82397F4307A7}"/>
+              </a:ext>
+            </a:extLst>
+          </p:cNvPr>
+          <p:cNvPicPr>
+            <a:picLocks noChangeAspect="1"/>
+          </p:cNvPicPr>
+          <p:nvPr/>
+        </p:nvPicPr>
+        <p:blipFill>
+          <a:blip r:embed="rId3"/>
+          <a:stretch>
+            <a:fillRect/>
+          </a:stretch>
+        </p:blipFill>
+        <p:spPr>
+          <a:xfrm>
+            <a:off x="2864809" y="3413157"/>
+            <a:ext cx="3185002" cy="3109864"/>
+          </a:xfrm>
+          <a:prstGeom prst="rect">
+            <a:avLst/>
+          </a:prstGeom>
+        </p:spPr>
+      </p:pic>
+    </p:spTree>
+    <p:extLst>
+      <p:ext uri="{BB962C8B-B14F-4D97-AF65-F5344CB8AC3E}">
+        <p14:creationId xmlns:p14="http://schemas.microsoft.com/office/powerpoint/2010/main" val="2440001060"/>
+      </p:ext>
+    </p:extLst>
+  </p:cSld>
+  <p:clrMapOvr>
+    <a:masterClrMapping/>
+  </p:clrMapOvr>
+</p:sld>
+</file>
+
+<file path=ppt/slides/slide31.xml><?xml version="1.0" encoding="utf-8"?>
+<p:sld xmlns:a="http://schemas.openxmlformats.org/drawingml/2006/main" xmlns:r="http://schemas.openxmlformats.org/officeDocument/2006/relationships" xmlns:p="http://schemas.openxmlformats.org/presentationml/2006/main">
+  <p:cSld>
+    <p:spTree>
+      <p:nvGrpSpPr>
+        <p:cNvPr id="1" name=""/>
+        <p:cNvGrpSpPr/>
+        <p:nvPr/>
+      </p:nvGrpSpPr>
+      <p:grpSpPr>
+        <a:xfrm>
+          <a:off x="0" y="0"/>
+          <a:ext cx="0" cy="0"/>
+          <a:chOff x="0" y="0"/>
+          <a:chExt cx="0" cy="0"/>
+        </a:xfrm>
+      </p:grpSpPr>
+      <p:sp>
+        <p:nvSpPr>
+          <p:cNvPr id="2" name="Title 1">
+            <a:extLst>
+              <a:ext uri="{FF2B5EF4-FFF2-40B4-BE49-F238E27FC236}">
+                <a16:creationId xmlns:a16="http://schemas.microsoft.com/office/drawing/2014/main" id="{D63C04CD-2329-4D47-84D9-12CB3EDD9F46}"/>
+              </a:ext>
+            </a:extLst>
+          </p:cNvPr>
+          <p:cNvSpPr>
+            <a:spLocks noGrp="1"/>
+          </p:cNvSpPr>
+          <p:nvPr>
+            <p:ph type="title"/>
+          </p:nvPr>
+        </p:nvSpPr>
+        <p:spPr>
+          <a:xfrm>
+            <a:off x="1141413" y="125537"/>
+            <a:ext cx="9905998" cy="860425"/>
+          </a:xfrm>
+        </p:spPr>
+        <p:txBody>
+          <a:bodyPr/>
+          <a:lstStyle/>
+          <a:p>
+            <a:pPr algn="ctr"/>
+            <a:r>
+              <a:rPr lang="en-US" dirty="0"/>
+              <a:t>What did we learn in this deck</a:t>
+            </a:r>
+          </a:p>
+        </p:txBody>
+      </p:sp>
+      <p:sp>
+        <p:nvSpPr>
+          <p:cNvPr id="6" name="Content Placeholder 2">
+            <a:extLst>
+              <a:ext uri="{FF2B5EF4-FFF2-40B4-BE49-F238E27FC236}">
+                <a16:creationId xmlns:a16="http://schemas.microsoft.com/office/drawing/2014/main" id="{D1AB4AE0-9143-C34D-B965-4033C921D6B5}"/>
+              </a:ext>
+            </a:extLst>
+          </p:cNvPr>
+          <p:cNvSpPr txBox="1">
+            <a:spLocks/>
+          </p:cNvSpPr>
+          <p:nvPr/>
+        </p:nvSpPr>
+        <p:spPr>
+          <a:xfrm>
+            <a:off x="1141412" y="2381061"/>
+            <a:ext cx="9905999" cy="2788467"/>
+          </a:xfrm>
+          <a:prstGeom prst="rect">
+            <a:avLst/>
+          </a:prstGeom>
+          <a:noFill/>
+        </p:spPr>
+        <p:txBody>
+          <a:bodyPr vert="horz" lIns="91440" tIns="45720" rIns="91440" bIns="45720" rtlCol="0">
+            <a:normAutofit/>
+          </a:bodyPr>
+          <a:lstStyle>
+            <a:lvl1pPr marL="228600" indent="-228600" algn="l" defTabSz="914400" rtl="0" eaLnBrk="1" latinLnBrk="0" hangingPunct="1">
+              <a:lnSpc>
+                <a:spcPct val="120000"/>
+              </a:lnSpc>
+              <a:spcBef>
+                <a:spcPts val="1000"/>
+              </a:spcBef>
+              <a:buSzPct val="125000"/>
+              <a:buFont typeface="Arial" panose="020B0604020202020204" pitchFamily="34" charset="0"/>
+              <a:buChar char="•"/>
+              <a:defRPr sz="2400" kern="1200">
+                <a:solidFill>
+                  <a:schemeClr val="tx1"/>
+                </a:solidFill>
+                <a:latin typeface="+mn-lt"/>
+                <a:ea typeface="+mn-ea"/>
+                <a:cs typeface="+mn-cs"/>
+              </a:defRPr>
+            </a:lvl1pPr>
+            <a:lvl2pPr marL="685800" indent="-228600" algn="l" defTabSz="914400" rtl="0" eaLnBrk="1" latinLnBrk="0" hangingPunct="1">
+              <a:lnSpc>
+                <a:spcPct val="120000"/>
+              </a:lnSpc>
+              <a:spcBef>
+                <a:spcPts val="500"/>
+              </a:spcBef>
+              <a:buSzPct val="125000"/>
+              <a:buFont typeface="Arial" panose="020B0604020202020204" pitchFamily="34" charset="0"/>
+              <a:buChar char="•"/>
+              <a:defRPr sz="2000" kern="1200">
+                <a:solidFill>
+                  <a:schemeClr val="tx1"/>
+                </a:solidFill>
+                <a:latin typeface="+mn-lt"/>
+                <a:ea typeface="+mn-ea"/>
+                <a:cs typeface="+mn-cs"/>
+              </a:defRPr>
+            </a:lvl2pPr>
+            <a:lvl3pPr marL="1143000" indent="-228600" algn="l" defTabSz="914400" rtl="0" eaLnBrk="1" latinLnBrk="0" hangingPunct="1">
+              <a:lnSpc>
+                <a:spcPct val="120000"/>
+              </a:lnSpc>
+              <a:spcBef>
+                <a:spcPts val="500"/>
+              </a:spcBef>
+              <a:buSzPct val="125000"/>
+              <a:buFont typeface="Arial" panose="020B0604020202020204" pitchFamily="34" charset="0"/>
+              <a:buChar char="•"/>
+              <a:defRPr sz="1800" kern="1200">
+                <a:solidFill>
+                  <a:schemeClr val="tx1"/>
+                </a:solidFill>
+                <a:latin typeface="+mn-lt"/>
+                <a:ea typeface="+mn-ea"/>
+                <a:cs typeface="+mn-cs"/>
+              </a:defRPr>
+            </a:lvl3pPr>
+            <a:lvl4pPr marL="1600200" indent="-228600" algn="l" defTabSz="914400" rtl="0" eaLnBrk="1" latinLnBrk="0" hangingPunct="1">
+              <a:lnSpc>
+                <a:spcPct val="120000"/>
+              </a:lnSpc>
+              <a:spcBef>
+                <a:spcPts val="500"/>
+              </a:spcBef>
+              <a:buSzPct val="125000"/>
+              <a:buFont typeface="Arial" panose="020B0604020202020204" pitchFamily="34" charset="0"/>
+              <a:buChar char="•"/>
+              <a:defRPr sz="1600" kern="1200">
+                <a:solidFill>
+                  <a:schemeClr val="tx1"/>
+                </a:solidFill>
+                <a:latin typeface="+mn-lt"/>
+                <a:ea typeface="+mn-ea"/>
+                <a:cs typeface="+mn-cs"/>
+              </a:defRPr>
+            </a:lvl4pPr>
+            <a:lvl5pPr marL="2057400" indent="-228600" algn="l" defTabSz="914400" rtl="0" eaLnBrk="1" latinLnBrk="0" hangingPunct="1">
+              <a:lnSpc>
+                <a:spcPct val="120000"/>
+              </a:lnSpc>
+              <a:spcBef>
+                <a:spcPts val="500"/>
+              </a:spcBef>
+              <a:buSzPct val="125000"/>
+              <a:buFont typeface="Arial" panose="020B0604020202020204" pitchFamily="34" charset="0"/>
+              <a:buChar char="•"/>
+              <a:defRPr sz="1600" kern="1200">
+                <a:solidFill>
+                  <a:schemeClr val="tx1"/>
+                </a:solidFill>
+                <a:latin typeface="+mn-lt"/>
+                <a:ea typeface="+mn-ea"/>
+                <a:cs typeface="+mn-cs"/>
+              </a:defRPr>
+            </a:lvl5pPr>
+            <a:lvl6pPr marL="2514600" indent="-228600" algn="l" defTabSz="914400" rtl="0" eaLnBrk="1" latinLnBrk="0" hangingPunct="1">
+              <a:lnSpc>
+                <a:spcPct val="120000"/>
+              </a:lnSpc>
+              <a:spcBef>
+                <a:spcPts val="500"/>
+              </a:spcBef>
+              <a:buSzPct val="125000"/>
+              <a:buFont typeface="Arial" panose="020B0604020202020204" pitchFamily="34" charset="0"/>
+              <a:buChar char="•"/>
+              <a:defRPr sz="1400" kern="1200">
+                <a:solidFill>
+                  <a:schemeClr val="tx1"/>
+                </a:solidFill>
+                <a:latin typeface="+mn-lt"/>
+                <a:ea typeface="+mn-ea"/>
+                <a:cs typeface="+mn-cs"/>
+              </a:defRPr>
+            </a:lvl6pPr>
+            <a:lvl7pPr marL="2971800" indent="-228600" algn="l" defTabSz="914400" rtl="0" eaLnBrk="1" latinLnBrk="0" hangingPunct="1">
+              <a:lnSpc>
+                <a:spcPct val="120000"/>
+              </a:lnSpc>
+              <a:spcBef>
+                <a:spcPts val="500"/>
+              </a:spcBef>
+              <a:buSzPct val="125000"/>
+              <a:buFont typeface="Arial" panose="020B0604020202020204" pitchFamily="34" charset="0"/>
+              <a:buChar char="•"/>
+              <a:defRPr sz="1400" kern="1200">
+                <a:solidFill>
+                  <a:schemeClr val="tx1"/>
+                </a:solidFill>
+                <a:latin typeface="+mn-lt"/>
+                <a:ea typeface="+mn-ea"/>
+                <a:cs typeface="+mn-cs"/>
+              </a:defRPr>
+            </a:lvl7pPr>
+            <a:lvl8pPr marL="3429000" indent="-228600" algn="l" defTabSz="914400" rtl="0" eaLnBrk="1" latinLnBrk="0" hangingPunct="1">
+              <a:lnSpc>
+                <a:spcPct val="120000"/>
+              </a:lnSpc>
+              <a:spcBef>
+                <a:spcPts val="500"/>
+              </a:spcBef>
+              <a:buSzPct val="125000"/>
+              <a:buFont typeface="Arial" panose="020B0604020202020204" pitchFamily="34" charset="0"/>
+              <a:buChar char="•"/>
+              <a:defRPr sz="1400" kern="1200">
+                <a:solidFill>
+                  <a:schemeClr val="tx1"/>
+                </a:solidFill>
+                <a:latin typeface="+mn-lt"/>
+                <a:ea typeface="+mn-ea"/>
+                <a:cs typeface="+mn-cs"/>
+              </a:defRPr>
+            </a:lvl8pPr>
+            <a:lvl9pPr marL="3886200" indent="-228600" algn="l" defTabSz="914400" rtl="0" eaLnBrk="1" latinLnBrk="0" hangingPunct="1">
+              <a:lnSpc>
+                <a:spcPct val="120000"/>
+              </a:lnSpc>
+              <a:spcBef>
+                <a:spcPts val="500"/>
+              </a:spcBef>
+              <a:buSzPct val="125000"/>
+              <a:buFont typeface="Arial" panose="020B0604020202020204" pitchFamily="34" charset="0"/>
+              <a:buChar char="•"/>
+              <a:defRPr sz="1400" kern="1200">
+                <a:solidFill>
+                  <a:schemeClr val="tx1"/>
+                </a:solidFill>
+                <a:latin typeface="+mn-lt"/>
+                <a:ea typeface="+mn-ea"/>
+                <a:cs typeface="+mn-cs"/>
+              </a:defRPr>
+            </a:lvl9pPr>
+          </a:lstStyle>
+          <a:p>
+            <a:pPr marL="457200" indent="-457200" algn="ctr">
+              <a:buFont typeface="Arial" panose="020B0604020202020204" pitchFamily="34" charset="0"/>
+              <a:buAutoNum type="arabicPeriod"/>
+            </a:pPr>
+            <a:r>
+              <a:rPr lang="en-US" dirty="0">
+                <a:solidFill>
+                  <a:schemeClr val="tx1">
+                    <a:lumMod val="95000"/>
+                  </a:schemeClr>
+                </a:solidFill>
+              </a:rPr>
+              <a:t>Definition of Turing Machines, both deterministic and non-deterministic along with other variants</a:t>
+            </a:r>
+          </a:p>
+          <a:p>
+            <a:pPr marL="457200" indent="-457200" algn="ctr">
+              <a:buFont typeface="Arial" panose="020B0604020202020204" pitchFamily="34" charset="0"/>
+              <a:buAutoNum type="arabicPeriod"/>
+            </a:pPr>
+            <a:r>
+              <a:rPr lang="en-US" dirty="0">
+                <a:solidFill>
+                  <a:schemeClr val="tx1">
+                    <a:lumMod val="95000"/>
+                  </a:schemeClr>
+                </a:solidFill>
+              </a:rPr>
+              <a:t>Simple design of algorithms using Turing Machines</a:t>
+            </a:r>
+          </a:p>
+          <a:p>
+            <a:pPr marL="457200" indent="-457200" algn="ctr">
+              <a:buFont typeface="Arial" panose="020B0604020202020204" pitchFamily="34" charset="0"/>
+              <a:buAutoNum type="arabicPeriod"/>
+            </a:pPr>
+            <a:r>
+              <a:rPr lang="en-US" dirty="0">
+                <a:solidFill>
+                  <a:schemeClr val="tx1">
+                    <a:lumMod val="95000"/>
+                  </a:schemeClr>
+                </a:solidFill>
+              </a:rPr>
+              <a:t>Definitions of recognizable vs decidable languages</a:t>
+            </a:r>
+          </a:p>
+        </p:txBody>
+      </p:sp>
+    </p:spTree>
+    <p:extLst>
+      <p:ext uri="{BB962C8B-B14F-4D97-AF65-F5344CB8AC3E}">
+        <p14:creationId xmlns:p14="http://schemas.microsoft.com/office/powerpoint/2010/main" val="3865959967"/>
       </p:ext>
     </p:extLst>
   </p:cSld>

</xml_diff>